<commit_message>
Core Value Activity, Lesson Use updated
</commit_message>
<xml_diff>
--- a/translations/en-us/beginner/LessonUse.pptx
+++ b/translations/en-us/beginner/LessonUse.pptx
@@ -6,16 +6,17 @@
     <p:sldMasterId id="2147483726" r:id="rId2"/>
   </p:sldMasterIdLst>
   <p:notesMasterIdLst>
-    <p:notesMasterId r:id="rId7"/>
+    <p:notesMasterId r:id="rId8"/>
   </p:notesMasterIdLst>
   <p:handoutMasterIdLst>
-    <p:handoutMasterId r:id="rId8"/>
+    <p:handoutMasterId r:id="rId9"/>
   </p:handoutMasterIdLst>
   <p:sldIdLst>
     <p:sldId id="408" r:id="rId3"/>
     <p:sldId id="412" r:id="rId4"/>
     <p:sldId id="411" r:id="rId5"/>
     <p:sldId id="413" r:id="rId6"/>
+    <p:sldId id="414" r:id="rId7"/>
   </p:sldIdLst>
   <p:sldSz cx="9144000" cy="6858000" type="screen4x3"/>
   <p:notesSz cx="6858000" cy="9144000"/>
@@ -116,7 +117,7 @@
   </p:defaultTextStyle>
   <p:extLst>
     <p:ext uri="{EFAFB233-063F-42B5-8137-9DF3F51BA10A}">
-      <p15:sldGuideLst xmlns:p15="http://schemas.microsoft.com/office/powerpoint/2012/main">
+      <p15:sldGuideLst xmlns:p15="http://schemas.microsoft.com/office/powerpoint/2012/main" xmlns="">
         <p15:guide id="1" orient="horz" pos="2160">
           <p15:clr>
             <a:srgbClr val="A4A3A4"/>
@@ -215,7 +216,7 @@
           <a:p>
             <a:fld id="{F8D9B3D7-15CB-9343-AA49-EFB5A8F33F18}" type="datetimeFigureOut">
               <a:rPr lang="en-US" smtClean="0"/>
-              <a:t>2/28/2015</a:t>
+              <a:t>9/22/15</a:t>
             </a:fld>
             <a:endParaRPr lang="en-US"/>
           </a:p>
@@ -381,7 +382,7 @@
           <a:p>
             <a:fld id="{FD3EFF1E-85A1-6640-AFB9-C38833E80A84}" type="datetimeFigureOut">
               <a:rPr lang="en-US" smtClean="0"/>
-              <a:t>2/28/2015</a:t>
+              <a:t>9/22/15</a:t>
             </a:fld>
             <a:endParaRPr lang="en-US"/>
           </a:p>
@@ -925,9 +926,9 @@
           <a:bodyPr/>
           <a:lstStyle/>
           <a:p>
-            <a:fld id="{EACB2B30-379C-4202-B1F3-D3B522878603}" type="datetime1">
-              <a:rPr lang="en-US" smtClean="0"/>
-              <a:t>2/28/2015</a:t>
+            <a:fld id="{96B7A8C7-3E09-7948-9D61-597B7A958F80}" type="datetime1">
+              <a:rPr lang="en-US" smtClean="0"/>
+              <a:t>9/22/15</a:t>
             </a:fld>
             <a:endParaRPr lang="en-US"/>
           </a:p>
@@ -950,7 +951,7 @@
           <a:p>
             <a:r>
               <a:rPr lang="en-US" smtClean="0"/>
-              <a:t>Copyright © EV3Lessons.com 2015 (Last edit: 2/26/2015)</a:t>
+              <a:t>Copyright © EV3Lessons.com 2015 (Last edit: 9/22/2015)</a:t>
             </a:r>
             <a:endParaRPr lang="en-US"/>
           </a:p>
@@ -1117,7 +1118,7 @@
   <p:timing>
     <p:tnLst>
       <p:par>
-        <p:cTn id="1" dur="indefinite" restart="never" nodeType="tmRoot"/>
+        <p:cTn xmlns:p14="http://schemas.microsoft.com/office/powerpoint/2010/main" id="1" dur="indefinite" restart="never" nodeType="tmRoot"/>
       </p:par>
     </p:tnLst>
   </p:timing>
@@ -1231,9 +1232,9 @@
           <a:bodyPr/>
           <a:lstStyle/>
           <a:p>
-            <a:fld id="{9712A3EB-3DEA-48FE-9BFC-EC2522B74ADE}" type="datetime1">
-              <a:rPr lang="en-US" smtClean="0"/>
-              <a:t>2/28/2015</a:t>
+            <a:fld id="{928D1CB7-C56B-BF4B-A8B6-8B3DA32F0C8E}" type="datetime1">
+              <a:rPr lang="en-US" smtClean="0"/>
+              <a:t>9/22/15</a:t>
             </a:fld>
             <a:endParaRPr lang="en-US"/>
           </a:p>
@@ -1256,7 +1257,7 @@
           <a:p>
             <a:r>
               <a:rPr lang="en-US" smtClean="0"/>
-              <a:t>Copyright © EV3Lessons.com 2015 (Last edit: 2/26/2015)</a:t>
+              <a:t>Copyright © EV3Lessons.com 2015 (Last edit: 9/22/2015)</a:t>
             </a:r>
             <a:endParaRPr lang="en-US"/>
           </a:p>
@@ -1418,9 +1419,9 @@
           <a:bodyPr/>
           <a:lstStyle/>
           <a:p>
-            <a:fld id="{70B33115-2338-48F2-AC41-157C6B87719A}" type="datetime1">
-              <a:rPr lang="en-US" smtClean="0"/>
-              <a:t>2/28/2015</a:t>
+            <a:fld id="{EBDC20D6-5ABB-7541-9C08-D37C43330BEE}" type="datetime1">
+              <a:rPr lang="en-US" smtClean="0"/>
+              <a:t>9/22/15</a:t>
             </a:fld>
             <a:endParaRPr lang="en-US"/>
           </a:p>
@@ -1443,7 +1444,7 @@
           <a:p>
             <a:r>
               <a:rPr lang="en-US" smtClean="0"/>
-              <a:t>Copyright © EV3Lessons.com 2015 (Last edit: 2/26/2015)</a:t>
+              <a:t>Copyright © EV3Lessons.com 2015 (Last edit: 9/22/2015)</a:t>
             </a:r>
             <a:endParaRPr lang="en-US"/>
           </a:p>
@@ -1617,9 +1618,9 @@
           <a:bodyPr/>
           <a:lstStyle/>
           <a:p>
-            <a:fld id="{52E4F7A2-CC09-4E29-8283-AB801139ECC9}" type="datetime1">
-              <a:rPr lang="en-US" smtClean="0"/>
-              <a:t>2/28/2015</a:t>
+            <a:fld id="{85CAE005-3157-D340-A2D8-A9470CED3900}" type="datetime1">
+              <a:rPr lang="en-US" smtClean="0"/>
+              <a:t>9/22/15</a:t>
             </a:fld>
             <a:endParaRPr lang="en-US"/>
           </a:p>
@@ -1642,7 +1643,7 @@
           <a:p>
             <a:r>
               <a:rPr lang="en-US" smtClean="0"/>
-              <a:t>Copyright © EV3Lessons.com 2015 (Last edit: 2/26/2015)</a:t>
+              <a:t>Copyright © EV3Lessons.com 2015 (Last edit: 9/22/2015)</a:t>
             </a:r>
             <a:endParaRPr lang="en-US"/>
           </a:p>
@@ -1791,9 +1792,9 @@
           <a:bodyPr/>
           <a:lstStyle/>
           <a:p>
-            <a:fld id="{DB04619B-604B-42D5-BB8F-A8BCBE6B2F1D}" type="datetime1">
-              <a:rPr lang="en-US" smtClean="0"/>
-              <a:t>2/28/2015</a:t>
+            <a:fld id="{EE76CAB0-D13E-9E4A-8100-ECA22F0E9C24}" type="datetime1">
+              <a:rPr lang="en-US" smtClean="0"/>
+              <a:t>9/22/15</a:t>
             </a:fld>
             <a:endParaRPr lang="en-US"/>
           </a:p>
@@ -1816,7 +1817,7 @@
           <a:p>
             <a:r>
               <a:rPr lang="en-US" smtClean="0"/>
-              <a:t>Copyright © EV3Lessons.com 2015 (Last edit: 2/26/2015)</a:t>
+              <a:t>Copyright © EV3Lessons.com 2015 (Last edit: 9/22/2015)</a:t>
             </a:r>
             <a:endParaRPr lang="en-US"/>
           </a:p>
@@ -2041,9 +2042,9 @@
           <a:bodyPr/>
           <a:lstStyle/>
           <a:p>
-            <a:fld id="{FBDC9A95-D134-4392-8040-E268F7574361}" type="datetime1">
-              <a:rPr lang="en-US" smtClean="0"/>
-              <a:t>2/28/2015</a:t>
+            <a:fld id="{DC7671E5-C857-7346-A42F-87A6992B2722}" type="datetime1">
+              <a:rPr lang="en-US" smtClean="0"/>
+              <a:t>9/22/15</a:t>
             </a:fld>
             <a:endParaRPr lang="en-US"/>
           </a:p>
@@ -2066,7 +2067,7 @@
           <a:p>
             <a:r>
               <a:rPr lang="en-US" smtClean="0"/>
-              <a:t>Copyright © EV3Lessons.com 2015 (Last edit: 2/26/2015)</a:t>
+              <a:t>Copyright © EV3Lessons.com 2015 (Last edit: 9/22/2015)</a:t>
             </a:r>
             <a:endParaRPr lang="en-US"/>
           </a:p>
@@ -2277,9 +2278,9 @@
           <a:bodyPr/>
           <a:lstStyle/>
           <a:p>
-            <a:fld id="{AC7018EF-5B37-49DF-9C9A-FBD17F454B3B}" type="datetime1">
-              <a:rPr lang="en-US" smtClean="0"/>
-              <a:t>2/28/2015</a:t>
+            <a:fld id="{7779CDEE-5736-8F45-BBD5-B69AC739AEBB}" type="datetime1">
+              <a:rPr lang="en-US" smtClean="0"/>
+              <a:t>9/22/15</a:t>
             </a:fld>
             <a:endParaRPr lang="en-US"/>
           </a:p>
@@ -2302,7 +2303,7 @@
           <a:p>
             <a:r>
               <a:rPr lang="en-US" smtClean="0"/>
-              <a:t>Copyright © EV3Lessons.com 2015 (Last edit: 2/26/2015)</a:t>
+              <a:t>Copyright © EV3Lessons.com 2015 (Last edit: 9/22/2015)</a:t>
             </a:r>
             <a:endParaRPr lang="en-US"/>
           </a:p>
@@ -2648,9 +2649,9 @@
           <a:bodyPr/>
           <a:lstStyle/>
           <a:p>
-            <a:fld id="{BE546CA9-EE68-465B-9E04-0F5EF2792ACB}" type="datetime1">
-              <a:rPr lang="en-US" smtClean="0"/>
-              <a:t>2/28/2015</a:t>
+            <a:fld id="{C88290E0-0391-E943-A294-DE2ECECE912E}" type="datetime1">
+              <a:rPr lang="en-US" smtClean="0"/>
+              <a:t>9/22/15</a:t>
             </a:fld>
             <a:endParaRPr lang="en-US"/>
           </a:p>
@@ -2673,7 +2674,7 @@
           <a:p>
             <a:r>
               <a:rPr lang="en-US" smtClean="0"/>
-              <a:t>Copyright © EV3Lessons.com 2015 (Last edit: 2/26/2015)</a:t>
+              <a:t>Copyright © EV3Lessons.com 2015 (Last edit: 9/22/2015)</a:t>
             </a:r>
             <a:endParaRPr lang="en-US"/>
           </a:p>
@@ -2770,9 +2771,9 @@
           <a:bodyPr/>
           <a:lstStyle/>
           <a:p>
-            <a:fld id="{C520C8DF-748B-4FF9-AC64-D91D47300A50}" type="datetime1">
-              <a:rPr lang="en-US" smtClean="0"/>
-              <a:t>2/28/2015</a:t>
+            <a:fld id="{07993D8C-9CD7-5B4A-992E-047532CE4569}" type="datetime1">
+              <a:rPr lang="en-US" smtClean="0"/>
+              <a:t>9/22/15</a:t>
             </a:fld>
             <a:endParaRPr lang="en-US"/>
           </a:p>
@@ -2795,7 +2796,7 @@
           <a:p>
             <a:r>
               <a:rPr lang="en-US" smtClean="0"/>
-              <a:t>Copyright © EV3Lessons.com 2015 (Last edit: 2/26/2015)</a:t>
+              <a:t>Copyright © EV3Lessons.com 2015 (Last edit: 9/22/2015)</a:t>
             </a:r>
             <a:endParaRPr lang="en-US"/>
           </a:p>
@@ -2869,9 +2870,9 @@
           <a:bodyPr/>
           <a:lstStyle/>
           <a:p>
-            <a:fld id="{9C1B64FC-0B07-4FCC-A4B7-2A793D98D8AF}" type="datetime1">
-              <a:rPr lang="en-US" smtClean="0"/>
-              <a:t>2/28/2015</a:t>
+            <a:fld id="{97D1D6EC-C1DC-9A47-A3E5-51BE8FBA26CB}" type="datetime1">
+              <a:rPr lang="en-US" smtClean="0"/>
+              <a:t>9/22/15</a:t>
             </a:fld>
             <a:endParaRPr lang="en-US"/>
           </a:p>
@@ -2894,7 +2895,7 @@
           <a:p>
             <a:r>
               <a:rPr lang="en-US" smtClean="0"/>
-              <a:t>Copyright © EV3Lessons.com 2015 (Last edit: 2/26/2015)</a:t>
+              <a:t>Copyright © EV3Lessons.com 2015 (Last edit: 9/22/2015)</a:t>
             </a:r>
             <a:endParaRPr lang="en-US"/>
           </a:p>
@@ -3150,9 +3151,9 @@
           <a:bodyPr/>
           <a:lstStyle/>
           <a:p>
-            <a:fld id="{44C30B84-0603-4FC7-84D9-BD9D09332374}" type="datetime1">
-              <a:rPr lang="en-US" smtClean="0"/>
-              <a:t>2/28/2015</a:t>
+            <a:fld id="{191202A3-C0FF-3048-96FB-FC47CA0194D5}" type="datetime1">
+              <a:rPr lang="en-US" smtClean="0"/>
+              <a:t>9/22/15</a:t>
             </a:fld>
             <a:endParaRPr lang="en-US"/>
           </a:p>
@@ -3175,7 +3176,7 @@
           <a:p>
             <a:r>
               <a:rPr lang="en-US" smtClean="0"/>
-              <a:t>Copyright © EV3Lessons.com 2015 (Last edit: 2/26/2015)</a:t>
+              <a:t>Copyright © EV3Lessons.com 2015 (Last edit: 9/22/2015)</a:t>
             </a:r>
             <a:endParaRPr lang="en-US"/>
           </a:p>
@@ -3334,9 +3335,9 @@
           <a:bodyPr/>
           <a:lstStyle/>
           <a:p>
-            <a:fld id="{DC74358E-D881-4525-B70A-DE14D094364E}" type="datetime1">
-              <a:rPr lang="en-US" smtClean="0"/>
-              <a:t>2/28/2015</a:t>
+            <a:fld id="{2B89C5B1-EA26-3E44-A56E-60E3A3FBEECC}" type="datetime1">
+              <a:rPr lang="en-US" smtClean="0"/>
+              <a:t>9/22/15</a:t>
             </a:fld>
             <a:endParaRPr lang="en-US"/>
           </a:p>
@@ -3359,7 +3360,7 @@
           <a:p>
             <a:r>
               <a:rPr lang="en-US" smtClean="0"/>
-              <a:t>Copyright © EV3Lessons.com 2015 (Last edit: 2/26/2015)</a:t>
+              <a:t>Copyright © EV3Lessons.com 2015 (Last edit: 9/22/2015)</a:t>
             </a:r>
             <a:endParaRPr lang="en-US"/>
           </a:p>
@@ -3404,7 +3405,7 @@
   <p:timing>
     <p:tnLst>
       <p:par>
-        <p:cTn id="1" dur="indefinite" restart="never" nodeType="tmRoot"/>
+        <p:cTn xmlns:p14="http://schemas.microsoft.com/office/powerpoint/2010/main" id="1" dur="indefinite" restart="never" nodeType="tmRoot"/>
       </p:par>
     </p:tnLst>
   </p:timing>
@@ -3601,9 +3602,9 @@
           <a:bodyPr/>
           <a:lstStyle/>
           <a:p>
-            <a:fld id="{2F6647C5-502E-4DBE-A7FD-E03B64209305}" type="datetime1">
-              <a:rPr lang="en-US" smtClean="0"/>
-              <a:t>2/28/2015</a:t>
+            <a:fld id="{ED929BD5-0ACA-474E-876B-0DBD1A53BAB0}" type="datetime1">
+              <a:rPr lang="en-US" smtClean="0"/>
+              <a:t>9/22/15</a:t>
             </a:fld>
             <a:endParaRPr lang="en-US"/>
           </a:p>
@@ -3626,7 +3627,7 @@
           <a:p>
             <a:r>
               <a:rPr lang="en-US" smtClean="0"/>
-              <a:t>Copyright © EV3Lessons.com 2015 (Last edit: 2/26/2015)</a:t>
+              <a:t>Copyright © EV3Lessons.com 2015 (Last edit: 9/22/2015)</a:t>
             </a:r>
             <a:endParaRPr lang="en-US"/>
           </a:p>
@@ -3775,9 +3776,9 @@
           <a:bodyPr/>
           <a:lstStyle/>
           <a:p>
-            <a:fld id="{4953AC36-85B5-4E03-A156-994A603185BA}" type="datetime1">
-              <a:rPr lang="en-US" smtClean="0"/>
-              <a:t>2/28/2015</a:t>
+            <a:fld id="{4436F3C7-9D5A-F044-88CB-ABFD6D2E2F89}" type="datetime1">
+              <a:rPr lang="en-US" smtClean="0"/>
+              <a:t>9/22/15</a:t>
             </a:fld>
             <a:endParaRPr lang="en-US"/>
           </a:p>
@@ -3800,7 +3801,7 @@
           <a:p>
             <a:r>
               <a:rPr lang="en-US" smtClean="0"/>
-              <a:t>Copyright © EV3Lessons.com 2015 (Last edit: 2/26/2015)</a:t>
+              <a:t>Copyright © EV3Lessons.com 2015 (Last edit: 9/22/2015)</a:t>
             </a:r>
             <a:endParaRPr lang="en-US"/>
           </a:p>
@@ -3959,9 +3960,9 @@
           <a:bodyPr/>
           <a:lstStyle/>
           <a:p>
-            <a:fld id="{7482BB1B-B86C-463F-9D70-9FBBAE58DDBA}" type="datetime1">
-              <a:rPr lang="en-US" smtClean="0"/>
-              <a:t>2/28/2015</a:t>
+            <a:fld id="{6C7A1C9B-5A27-9843-B14A-B38D5EF75BE9}" type="datetime1">
+              <a:rPr lang="en-US" smtClean="0"/>
+              <a:t>9/22/15</a:t>
             </a:fld>
             <a:endParaRPr lang="en-US"/>
           </a:p>
@@ -3984,7 +3985,7 @@
           <a:p>
             <a:r>
               <a:rPr lang="en-US" smtClean="0"/>
-              <a:t>Copyright © EV3Lessons.com 2015 (Last edit: 2/26/2015)</a:t>
+              <a:t>Copyright © EV3Lessons.com 2015 (Last edit: 9/22/2015)</a:t>
             </a:r>
             <a:endParaRPr lang="en-US"/>
           </a:p>
@@ -4217,9 +4218,9 @@
           <a:bodyPr/>
           <a:lstStyle/>
           <a:p>
-            <a:fld id="{FFFC3E62-AF39-4395-90BD-B8A775E66488}" type="datetime1">
-              <a:rPr lang="en-US" smtClean="0"/>
-              <a:t>2/28/2015</a:t>
+            <a:fld id="{0F810EF1-DF42-F24D-8C3A-58AD7534091D}" type="datetime1">
+              <a:rPr lang="en-US" smtClean="0"/>
+              <a:t>9/22/15</a:t>
             </a:fld>
             <a:endParaRPr lang="en-US"/>
           </a:p>
@@ -4273,7 +4274,7 @@
           <a:p>
             <a:r>
               <a:rPr lang="en-US" smtClean="0"/>
-              <a:t>Copyright © EV3Lessons.com 2015 (Last edit: 2/26/2015)</a:t>
+              <a:t>Copyright © EV3Lessons.com 2015 (Last edit: 9/22/2015)</a:t>
             </a:r>
             <a:endParaRPr lang="en-US"/>
           </a:p>
@@ -4517,9 +4518,9 @@
           <a:bodyPr/>
           <a:lstStyle/>
           <a:p>
-            <a:fld id="{26F539D2-F48F-443B-BF38-2A6C95CF6A7F}" type="datetime1">
-              <a:rPr lang="en-US" smtClean="0"/>
-              <a:t>2/28/2015</a:t>
+            <a:fld id="{38F43DA9-2CDB-A147-8C82-99A07F0378F7}" type="datetime1">
+              <a:rPr lang="en-US" smtClean="0"/>
+              <a:t>9/22/15</a:t>
             </a:fld>
             <a:endParaRPr lang="en-US"/>
           </a:p>
@@ -4542,7 +4543,7 @@
           <a:p>
             <a:r>
               <a:rPr lang="en-US" smtClean="0"/>
-              <a:t>Copyright © EV3Lessons.com 2015 (Last edit: 2/26/2015)</a:t>
+              <a:t>Copyright © EV3Lessons.com 2015 (Last edit: 9/22/2015)</a:t>
             </a:r>
             <a:endParaRPr lang="en-US"/>
           </a:p>
@@ -4587,7 +4588,7 @@
   <p:timing>
     <p:tnLst>
       <p:par>
-        <p:cTn id="1" dur="indefinite" restart="never" nodeType="tmRoot"/>
+        <p:cTn xmlns:p14="http://schemas.microsoft.com/office/powerpoint/2010/main" id="1" dur="indefinite" restart="never" nodeType="tmRoot"/>
       </p:par>
     </p:tnLst>
   </p:timing>
@@ -4975,9 +4976,9 @@
           <a:bodyPr/>
           <a:lstStyle/>
           <a:p>
-            <a:fld id="{F7A58AE1-8CA8-48CF-ABF4-408B23C67943}" type="datetime1">
-              <a:rPr lang="en-US" smtClean="0"/>
-              <a:t>2/28/2015</a:t>
+            <a:fld id="{48594044-3535-0748-B038-1BEFF304CA5B}" type="datetime1">
+              <a:rPr lang="en-US" smtClean="0"/>
+              <a:t>9/22/15</a:t>
             </a:fld>
             <a:endParaRPr lang="en-US"/>
           </a:p>
@@ -5000,7 +5001,7 @@
           <a:p>
             <a:r>
               <a:rPr lang="en-US" smtClean="0"/>
-              <a:t>Copyright © EV3Lessons.com 2015 (Last edit: 2/26/2015)</a:t>
+              <a:t>Copyright © EV3Lessons.com 2015 (Last edit: 9/22/2015)</a:t>
             </a:r>
             <a:endParaRPr lang="en-US"/>
           </a:p>
@@ -5045,7 +5046,7 @@
   <p:timing>
     <p:tnLst>
       <p:par>
-        <p:cTn id="1" dur="indefinite" restart="never" nodeType="tmRoot"/>
+        <p:cTn xmlns:p14="http://schemas.microsoft.com/office/powerpoint/2010/main" id="1" dur="indefinite" restart="never" nodeType="tmRoot"/>
       </p:par>
     </p:tnLst>
   </p:timing>
@@ -5107,9 +5108,9 @@
           <a:bodyPr/>
           <a:lstStyle/>
           <a:p>
-            <a:fld id="{2B29D99D-AE80-4750-840C-EB9806DF3A06}" type="datetime1">
-              <a:rPr lang="en-US" smtClean="0"/>
-              <a:t>2/28/2015</a:t>
+            <a:fld id="{A15E8011-2CFF-034B-A4AB-D6037936BBDC}" type="datetime1">
+              <a:rPr lang="en-US" smtClean="0"/>
+              <a:t>9/22/15</a:t>
             </a:fld>
             <a:endParaRPr lang="en-US"/>
           </a:p>
@@ -5132,7 +5133,7 @@
           <a:p>
             <a:r>
               <a:rPr lang="en-US" smtClean="0"/>
-              <a:t>Copyright © EV3Lessons.com 2015 (Last edit: 2/26/2015)</a:t>
+              <a:t>Copyright © EV3Lessons.com 2015 (Last edit: 9/22/2015)</a:t>
             </a:r>
             <a:endParaRPr lang="en-US"/>
           </a:p>
@@ -5177,7 +5178,7 @@
   <p:timing>
     <p:tnLst>
       <p:par>
-        <p:cTn id="1" dur="indefinite" restart="never" nodeType="tmRoot"/>
+        <p:cTn xmlns:p14="http://schemas.microsoft.com/office/powerpoint/2010/main" id="1" dur="indefinite" restart="never" nodeType="tmRoot"/>
       </p:par>
     </p:tnLst>
   </p:timing>
@@ -5216,9 +5217,9 @@
           <a:bodyPr/>
           <a:lstStyle/>
           <a:p>
-            <a:fld id="{B7F5DAF1-C883-426E-9BD0-729F56E7A62E}" type="datetime1">
-              <a:rPr lang="en-US" smtClean="0"/>
-              <a:t>2/28/2015</a:t>
+            <a:fld id="{EC1F204B-656E-0747-8D25-7B7C5C06A4B8}" type="datetime1">
+              <a:rPr lang="en-US" smtClean="0"/>
+              <a:t>9/22/15</a:t>
             </a:fld>
             <a:endParaRPr lang="en-US"/>
           </a:p>
@@ -5241,7 +5242,7 @@
           <a:p>
             <a:r>
               <a:rPr lang="en-US" smtClean="0"/>
-              <a:t>Copyright © EV3Lessons.com 2015 (Last edit: 2/26/2015)</a:t>
+              <a:t>Copyright © EV3Lessons.com 2015 (Last edit: 9/22/2015)</a:t>
             </a:r>
             <a:endParaRPr lang="en-US"/>
           </a:p>
@@ -5470,9 +5471,9 @@
           <a:bodyPr/>
           <a:lstStyle/>
           <a:p>
-            <a:fld id="{2600421B-2FF4-4681-B8FD-017EFCF479E2}" type="datetime1">
-              <a:rPr lang="en-US" smtClean="0"/>
-              <a:t>2/28/2015</a:t>
+            <a:fld id="{171B77B7-E402-384D-A641-AD006442A591}" type="datetime1">
+              <a:rPr lang="en-US" smtClean="0"/>
+              <a:t>9/22/15</a:t>
             </a:fld>
             <a:endParaRPr lang="en-US"/>
           </a:p>
@@ -5495,7 +5496,7 @@
           <a:p>
             <a:r>
               <a:rPr lang="en-US" smtClean="0"/>
-              <a:t>Copyright © EV3Lessons.com 2015 (Last edit: 2/26/2015)</a:t>
+              <a:t>Copyright © EV3Lessons.com 2015 (Last edit: 9/22/2015)</a:t>
             </a:r>
             <a:endParaRPr lang="en-US"/>
           </a:p>
@@ -5776,9 +5777,9 @@
           <a:bodyPr/>
           <a:lstStyle/>
           <a:p>
-            <a:fld id="{A2AE46EC-01D0-4B23-8616-BD85B7D82CBA}" type="datetime1">
-              <a:rPr lang="en-US" smtClean="0"/>
-              <a:t>2/28/2015</a:t>
+            <a:fld id="{D9B5BAA5-C4FC-5040-A6EA-0990473972FD}" type="datetime1">
+              <a:rPr lang="en-US" smtClean="0"/>
+              <a:t>9/22/15</a:t>
             </a:fld>
             <a:endParaRPr lang="en-US"/>
           </a:p>
@@ -5801,7 +5802,7 @@
           <a:p>
             <a:r>
               <a:rPr lang="en-US" smtClean="0"/>
-              <a:t>Copyright © EV3Lessons.com 2015 (Last edit: 2/26/2015)</a:t>
+              <a:t>Copyright © EV3Lessons.com 2015 (Last edit: 9/22/2015)</a:t>
             </a:r>
             <a:endParaRPr lang="en-US"/>
           </a:p>
@@ -6082,9 +6083,9 @@
             </a:lvl1pPr>
           </a:lstStyle>
           <a:p>
-            <a:fld id="{29A57015-001D-4DE7-896F-4E51C0D3D8D0}" type="datetime1">
-              <a:rPr lang="en-US" smtClean="0"/>
-              <a:t>2/28/2015</a:t>
+            <a:fld id="{C51BF14C-0C23-8145-B87B-6B15C9E6EA39}" type="datetime1">
+              <a:rPr lang="en-US" smtClean="0"/>
+              <a:t>9/22/15</a:t>
             </a:fld>
             <a:endParaRPr lang="en-US"/>
           </a:p>
@@ -6123,7 +6124,7 @@
           <a:p>
             <a:r>
               <a:rPr lang="en-US" smtClean="0"/>
-              <a:t>Copyright © EV3Lessons.com 2015 (Last edit: 2/26/2015)</a:t>
+              <a:t>Copyright © EV3Lessons.com 2015 (Last edit: 9/22/2015)</a:t>
             </a:r>
             <a:endParaRPr lang="en-US" dirty="0"/>
           </a:p>
@@ -6293,11 +6294,11 @@
   <p:timing>
     <p:tnLst>
       <p:par>
-        <p:cTn id="1" dur="indefinite" restart="never" nodeType="tmRoot"/>
+        <p:cTn xmlns:p14="http://schemas.microsoft.com/office/powerpoint/2010/main" id="1" dur="indefinite" restart="never" nodeType="tmRoot"/>
       </p:par>
     </p:tnLst>
   </p:timing>
-  <p:hf hdr="0" dt="0"/>
+  <p:hf sldNum="0" hdr="0" dt="0"/>
   <p:txStyles>
     <p:titleStyle>
       <a:lvl1pPr algn="l" defTabSz="914400" rtl="0" eaLnBrk="1" latinLnBrk="0" hangingPunct="1">
@@ -6728,9 +6729,9 @@
             </a:lvl1pPr>
           </a:lstStyle>
           <a:p>
-            <a:fld id="{D889A880-9C41-474C-89CB-FEF116EF758F}" type="datetime1">
-              <a:rPr lang="en-US" smtClean="0"/>
-              <a:t>2/28/2015</a:t>
+            <a:fld id="{BBE75C5C-58CF-1943-9D9F-B2EA5B1BC003}" type="datetime1">
+              <a:rPr lang="en-US" smtClean="0"/>
+              <a:t>9/22/15</a:t>
             </a:fld>
             <a:endParaRPr lang="en-US"/>
           </a:p>
@@ -6771,7 +6772,7 @@
           <a:p>
             <a:r>
               <a:rPr lang="en-US" smtClean="0"/>
-              <a:t>Copyright © EV3Lessons.com 2015 (Last edit: 2/26/2015)</a:t>
+              <a:t>Copyright © EV3Lessons.com 2015 (Last edit: 9/22/2015)</a:t>
             </a:r>
             <a:endParaRPr lang="en-US"/>
           </a:p>
@@ -6839,7 +6840,7 @@
     <p:sldLayoutId id="2147483736" r:id="rId10"/>
     <p:sldLayoutId id="2147483737" r:id="rId11"/>
   </p:sldLayoutIdLst>
-  <p:hf hdr="0" dt="0"/>
+  <p:hf sldNum="0" hdr="0" dt="0"/>
   <p:txStyles>
     <p:titleStyle>
       <a:lvl1pPr algn="l" defTabSz="914400" rtl="0" eaLnBrk="1" latinLnBrk="0" hangingPunct="1">
@@ -7142,72 +7143,13 @@
       </p:grpSpPr>
       <p:sp>
         <p:nvSpPr>
-          <p:cNvPr id="7" name="TextBox 6"/>
-          <p:cNvSpPr txBox="1"/>
-          <p:nvPr/>
-        </p:nvSpPr>
-        <p:spPr>
-          <a:xfrm>
-            <a:off x="1487501" y="5949643"/>
-            <a:ext cx="4750545" cy="523220"/>
-          </a:xfrm>
-          <a:prstGeom prst="rect">
-            <a:avLst/>
-          </a:prstGeom>
-          <a:noFill/>
-        </p:spPr>
-        <p:txBody>
-          <a:bodyPr wrap="square" rtlCol="0">
-            <a:spAutoFit/>
-          </a:bodyPr>
-          <a:lstStyle/>
-          <a:p>
-            <a:r>
-              <a:rPr lang="en-US" sz="2800" dirty="0" smtClean="0"/>
-              <a:t>By: Droids Robotics</a:t>
-            </a:r>
-          </a:p>
-        </p:txBody>
-      </p:sp>
-      <p:pic>
-        <p:nvPicPr>
-          <p:cNvPr id="3" name="Picture 2" descr="Droidslogo2.png"/>
-          <p:cNvPicPr>
-            <a:picLocks noChangeAspect="1"/>
-          </p:cNvPicPr>
-          <p:nvPr/>
-        </p:nvPicPr>
-        <p:blipFill>
-          <a:blip r:embed="rId3">
-            <a:extLst>
-              <a:ext uri="{28A0092B-C50C-407E-A947-70E740481C1C}">
-                <a14:useLocalDpi xmlns:a14="http://schemas.microsoft.com/office/drawing/2010/main" val="0"/>
-              </a:ext>
-            </a:extLst>
-          </a:blip>
-          <a:stretch>
-            <a:fillRect/>
-          </a:stretch>
-        </p:blipFill>
-        <p:spPr>
-          <a:xfrm>
-            <a:off x="402306" y="5456830"/>
-            <a:ext cx="1085195" cy="1085195"/>
-          </a:xfrm>
-          <a:prstGeom prst="rect">
-            <a:avLst/>
-          </a:prstGeom>
-        </p:spPr>
-      </p:pic>
-      <p:sp>
-        <p:nvSpPr>
           <p:cNvPr id="4" name="TextBox 3"/>
           <p:cNvSpPr txBox="1"/>
           <p:nvPr/>
         </p:nvSpPr>
         <p:spPr>
           <a:xfrm>
-            <a:off x="2429468" y="2687449"/>
+            <a:off x="2030936" y="3510939"/>
             <a:ext cx="4927357" cy="523220"/>
           </a:xfrm>
           <a:prstGeom prst="rect">
@@ -7242,7 +7184,7 @@
           <p:nvPr/>
         </p:nvPicPr>
         <p:blipFill>
-          <a:blip r:embed="rId4">
+          <a:blip r:embed="rId3">
             <a:extLst>
               <a:ext uri="{28A0092B-C50C-407E-A947-70E740481C1C}">
                 <a14:useLocalDpi xmlns:a14="http://schemas.microsoft.com/office/drawing/2010/main" val="0"/>
@@ -7256,7 +7198,7 @@
         </p:blipFill>
         <p:spPr bwMode="auto">
           <a:xfrm>
-            <a:off x="2726595" y="855473"/>
+            <a:off x="2328063" y="1678963"/>
             <a:ext cx="4231698" cy="1571774"/>
           </a:xfrm>
           <a:prstGeom prst="rect">
@@ -7265,7 +7207,7 @@
           <a:noFill/>
           <a:extLst>
             <a:ext uri="{909E8E84-426E-40dd-AFC4-6F175D3DCCD1}">
-              <a14:hiddenFill xmlns:a14="http://schemas.microsoft.com/office/drawing/2010/main" xmlns="">
+              <a14:hiddenFill xmlns:a14="http://schemas.microsoft.com/office/drawing/2010/main">
                 <a:solidFill>
                   <a:srgbClr val="FFFFFF"/>
                 </a:solidFill>
@@ -7287,7 +7229,7 @@
   <p:timing>
     <p:tnLst>
       <p:par>
-        <p:cTn id="1" dur="indefinite" restart="never" nodeType="tmRoot"/>
+        <p:cTn xmlns:p14="http://schemas.microsoft.com/office/powerpoint/2010/main" id="1" dur="indefinite" restart="never" nodeType="tmRoot"/>
       </p:par>
     </p:tnLst>
   </p:timing>
@@ -7328,15 +7270,7 @@
           <a:p>
             <a:r>
               <a:rPr lang="en-US" dirty="0" smtClean="0"/>
-              <a:t>Is There </a:t>
-            </a:r>
-            <a:r>
-              <a:rPr lang="en-US" dirty="0" err="1" smtClean="0"/>
-              <a:t>aN</a:t>
-            </a:r>
-            <a:r>
-              <a:rPr lang="en-US" dirty="0" smtClean="0"/>
-              <a:t> ORDER To The Lessons?</a:t>
+              <a:t>OVERALL STRUCTURE</a:t>
             </a:r>
             <a:endParaRPr lang="en-US" dirty="0"/>
           </a:p>
@@ -7360,8 +7294,8 @@
           <a:lstStyle/>
           <a:p>
             <a:pPr marL="457200" indent="-457200">
-              <a:buFont typeface="+mj-lt"/>
-              <a:buAutoNum type="arabicPeriod"/>
+              <a:buFont typeface="Arial"/>
+              <a:buChar char="•"/>
             </a:pPr>
             <a:r>
               <a:rPr lang="en-US" u="sng" dirty="0" smtClean="0"/>
@@ -7378,8 +7312,8 @@
           </a:p>
           <a:p>
             <a:pPr marL="457200" indent="-457200">
-              <a:buFont typeface="+mj-lt"/>
-              <a:buAutoNum type="arabicPeriod"/>
+              <a:buFont typeface="Arial"/>
+              <a:buChar char="•"/>
             </a:pPr>
             <a:r>
               <a:rPr lang="en-US" u="sng" dirty="0"/>
@@ -7424,8 +7358,8 @@
           </a:p>
           <a:p>
             <a:pPr marL="457200" indent="-457200">
-              <a:buFont typeface="+mj-lt"/>
-              <a:buAutoNum type="arabicPeriod"/>
+              <a:buFont typeface="Arial"/>
+              <a:buChar char="•"/>
             </a:pPr>
             <a:r>
               <a:rPr lang="en-US" u="sng" dirty="0" smtClean="0"/>
@@ -7445,13 +7379,21 @@
             </a:r>
             <a:r>
               <a:rPr lang="en-US" b="0" dirty="0" smtClean="0"/>
-              <a:t>systems, proportional line followers, line alignment and stall detection techniques.</a:t>
+              <a:t>systems, proportional line followers, </a:t>
+            </a:r>
+            <a:r>
+              <a:rPr lang="en-US" b="0" dirty="0" smtClean="0"/>
+              <a:t>squaring on lines and </a:t>
+            </a:r>
+            <a:r>
+              <a:rPr lang="en-US" b="0" dirty="0" smtClean="0"/>
+              <a:t>stall detection techniques.</a:t>
             </a:r>
           </a:p>
           <a:p>
             <a:pPr marL="457200" indent="-457200">
-              <a:buFont typeface="+mj-lt"/>
-              <a:buAutoNum type="arabicPeriod"/>
+              <a:buFont typeface="Arial"/>
+              <a:buChar char="•"/>
             </a:pPr>
             <a:r>
               <a:rPr lang="en-US" b="0" dirty="0" smtClean="0"/>
@@ -7506,31 +7448,8 @@
           <a:p>
             <a:r>
               <a:rPr lang="en-US" smtClean="0"/>
-              <a:t>Copyright © EV3Lessons.com 2015 (Last edit: 2/26/2015)</a:t>
-            </a:r>
-            <a:endParaRPr lang="en-US"/>
-          </a:p>
-        </p:txBody>
-      </p:sp>
-      <p:sp>
-        <p:nvSpPr>
-          <p:cNvPr id="5" name="Slide Number Placeholder 4"/>
-          <p:cNvSpPr>
-            <a:spLocks noGrp="1"/>
-          </p:cNvSpPr>
-          <p:nvPr>
-            <p:ph type="sldNum" sz="quarter" idx="12"/>
-          </p:nvPr>
-        </p:nvSpPr>
-        <p:spPr/>
-        <p:txBody>
-          <a:bodyPr/>
-          <a:lstStyle/>
-          <a:p>
-            <a:fld id="{4DBC7FC8-25FB-FC45-8177-2B991DA6778C}" type="slidenum">
-              <a:rPr lang="en-US" smtClean="0"/>
-              <a:t>2</a:t>
-            </a:fld>
+              <a:t>Copyright © EV3Lessons.com 2015 (Last edit: 9/22/2015)</a:t>
+            </a:r>
             <a:endParaRPr lang="en-US"/>
           </a:p>
         </p:txBody>
@@ -7582,7 +7501,11 @@
           <a:p>
             <a:r>
               <a:rPr lang="en-US" dirty="0" smtClean="0"/>
-              <a:t>INDIVIDUAL Lesson Structure</a:t>
+              <a:t>Lesson </a:t>
+            </a:r>
+            <a:r>
+              <a:rPr lang="en-US" dirty="0" smtClean="0"/>
+              <a:t>Structure</a:t>
             </a:r>
             <a:endParaRPr lang="en-US" dirty="0"/>
           </a:p>
@@ -7609,7 +7532,11 @@
             </a:pPr>
             <a:r>
               <a:rPr lang="en-US" dirty="0" smtClean="0"/>
-              <a:t>Each lesson starts with a list of objectives and ends with a challenge</a:t>
+              <a:t>Each lesson starts with a list of objectives and ends with a </a:t>
+            </a:r>
+            <a:r>
+              <a:rPr lang="en-US" dirty="0" smtClean="0"/>
+              <a:t>challenge</a:t>
             </a:r>
           </a:p>
           <a:p>
@@ -7619,7 +7546,27 @@
             </a:pPr>
             <a:r>
               <a:rPr lang="en-US" dirty="0" smtClean="0"/>
-              <a:t>A discussion guide is included after the challenge that will help understand the main objectives</a:t>
+              <a:t>In most lessons, we</a:t>
+            </a:r>
+            <a:r>
+              <a:rPr lang="en-US" dirty="0" smtClean="0"/>
+              <a:t> provide hints in the form of </a:t>
+            </a:r>
+            <a:r>
+              <a:rPr lang="en-US" dirty="0" err="1" smtClean="0"/>
+              <a:t>Pseudocode</a:t>
+            </a:r>
+            <a:r>
+              <a:rPr lang="en-US" dirty="0" smtClean="0"/>
+              <a:t>.  Students who need a hint should look at the </a:t>
+            </a:r>
+            <a:r>
+              <a:rPr lang="en-US" dirty="0" err="1" smtClean="0"/>
+              <a:t>Pseudocode</a:t>
+            </a:r>
+            <a:r>
+              <a:rPr lang="en-US" dirty="0" smtClean="0"/>
+              <a:t>.</a:t>
             </a:r>
           </a:p>
           <a:p>
@@ -7629,15 +7576,34 @@
             </a:pPr>
             <a:r>
               <a:rPr lang="en-US" dirty="0" smtClean="0"/>
-              <a:t>Many lessons have companion worksheets for students.  More will be added over time.</a:t>
-            </a:r>
-          </a:p>
-          <a:p>
-            <a:pPr marL="342900" indent="-342900">
-              <a:buFont typeface="Arial" panose="020B0604020202020204" pitchFamily="34" charset="0"/>
-              <a:buChar char="•"/>
+              <a:t>We provide a challenge solution as well (both as a screenshot as well as in EV3 Code)</a:t>
+            </a:r>
+            <a:endParaRPr lang="en-US" dirty="0" smtClean="0"/>
+          </a:p>
+          <a:p>
+            <a:pPr marL="457200" indent="-457200">
+              <a:buFont typeface="+mj-lt"/>
+              <a:buAutoNum type="arabicPeriod"/>
             </a:pPr>
-            <a:endParaRPr lang="en-US" dirty="0"/>
+            <a:r>
+              <a:rPr lang="en-US" dirty="0" smtClean="0"/>
+              <a:t>A discussion guide is included after the challenge that will help understand the main objectives</a:t>
+            </a:r>
+          </a:p>
+          <a:p>
+            <a:pPr marL="457200" indent="-457200">
+              <a:buFont typeface="+mj-lt"/>
+              <a:buAutoNum type="arabicPeriod"/>
+            </a:pPr>
+            <a:r>
+              <a:rPr lang="en-US" dirty="0" smtClean="0"/>
+              <a:t>Many lessons have companion worksheets for students.  More will be added over time</a:t>
+            </a:r>
+            <a:r>
+              <a:rPr lang="en-US" dirty="0" smtClean="0"/>
+              <a:t>.</a:t>
+            </a:r>
+            <a:endParaRPr lang="en-US" dirty="0" smtClean="0"/>
           </a:p>
         </p:txBody>
       </p:sp>
@@ -7658,31 +7624,8 @@
           <a:p>
             <a:r>
               <a:rPr lang="en-US" smtClean="0"/>
-              <a:t>Copyright © EV3Lessons.com 2015 (Last edit: 2/26/2015)</a:t>
-            </a:r>
-            <a:endParaRPr lang="en-US"/>
-          </a:p>
-        </p:txBody>
-      </p:sp>
-      <p:sp>
-        <p:nvSpPr>
-          <p:cNvPr id="5" name="Slide Number Placeholder 4"/>
-          <p:cNvSpPr>
-            <a:spLocks noGrp="1"/>
-          </p:cNvSpPr>
-          <p:nvPr>
-            <p:ph type="sldNum" sz="quarter" idx="12"/>
-          </p:nvPr>
-        </p:nvSpPr>
-        <p:spPr/>
-        <p:txBody>
-          <a:bodyPr/>
-          <a:lstStyle/>
-          <a:p>
-            <a:fld id="{4DBC7FC8-25FB-FC45-8177-2B991DA6778C}" type="slidenum">
-              <a:rPr lang="en-US" smtClean="0"/>
-              <a:t>3</a:t>
-            </a:fld>
+              <a:t>Copyright © EV3Lessons.com 2015 (Last edit: 9/22/2015)</a:t>
+            </a:r>
             <a:endParaRPr lang="en-US"/>
           </a:p>
         </p:txBody>
@@ -7734,23 +7677,7 @@
           <a:p>
             <a:r>
               <a:rPr lang="en-US" dirty="0" smtClean="0"/>
-              <a:t>Available Topics </a:t>
-            </a:r>
-            <a:r>
-              <a:rPr lang="en-US" dirty="0" smtClean="0"/>
-              <a:t>(</a:t>
-            </a:r>
-            <a:r>
-              <a:rPr lang="en-US" dirty="0" smtClean="0"/>
-              <a:t>AS OF</a:t>
-            </a:r>
-            <a:r>
-              <a:rPr lang="en-US" dirty="0" smtClean="0"/>
-              <a:t> </a:t>
-            </a:r>
-            <a:r>
-              <a:rPr lang="en-US" dirty="0" smtClean="0"/>
-              <a:t>March 1, 2015)</a:t>
+              <a:t>PROGRAMMING LESSONS</a:t>
             </a:r>
             <a:endParaRPr lang="en-US" dirty="0"/>
           </a:p>
@@ -7766,27 +7693,27 @@
             <p:ph idx="1"/>
             <p:extLst>
               <p:ext uri="{D42A27DB-BD31-4B8C-83A1-F6EECF244321}">
-                <p14:modId xmlns:p14="http://schemas.microsoft.com/office/powerpoint/2010/main" val="1656037423"/>
+                <p14:modId xmlns:p14="http://schemas.microsoft.com/office/powerpoint/2010/main" val="3983457710"/>
               </p:ext>
             </p:extLst>
           </p:nvPr>
         </p:nvGraphicFramePr>
         <p:xfrm>
-          <a:off x="457200" y="1752600"/>
-          <a:ext cx="8245476" cy="4419600"/>
+          <a:off x="378639" y="1021335"/>
+          <a:ext cx="8245476" cy="5462801"/>
         </p:xfrm>
         <a:graphic>
           <a:graphicData uri="http://schemas.openxmlformats.org/drawingml/2006/table">
             <a:tbl>
               <a:tblPr firstRow="1" bandRow="1">
-                <a:tableStyleId>{21E4AEA4-8DFA-4A89-87EB-49C32662AFE0}</a:tableStyleId>
+                <a:tableStyleId>{69CF1AB2-1976-4502-BF36-3FF5EA218861}</a:tableStyleId>
               </a:tblPr>
               <a:tblGrid>
                 <a:gridCol w="2748492"/>
                 <a:gridCol w="2748492"/>
                 <a:gridCol w="2748492"/>
               </a:tblGrid>
-              <a:tr h="370840">
+              <a:tr h="1741506">
                 <a:tc>
                   <a:txBody>
                     <a:bodyPr/>
@@ -7794,32 +7721,24 @@
                     <a:p>
                       <a:pPr algn="ctr"/>
                       <a:r>
-                        <a:rPr lang="en-US" dirty="0" smtClean="0">
-                          <a:solidFill>
-                            <a:schemeClr val="tx1"/>
-                          </a:solidFill>
-                        </a:rPr>
+                        <a:rPr lang="en-US" sz="1600" dirty="0" smtClean="0"/>
                         <a:t>Beginner</a:t>
                       </a:r>
-                    </a:p>
-                    <a:p>
-                      <a:pPr algn="ctr"/>
-                      <a:r>
-                        <a:rPr lang="en-US" dirty="0" smtClean="0">
-                          <a:solidFill>
-                            <a:schemeClr val="tx1"/>
-                          </a:solidFill>
-                        </a:rPr>
-                        <a:t>(in recommended order)</a:t>
-                      </a:r>
-                      <a:endParaRPr lang="en-US" dirty="0">
+                      <a:endParaRPr lang="en-US" sz="1600" dirty="0" smtClean="0">
                         <a:solidFill>
                           <a:schemeClr val="tx1"/>
                         </a:solidFill>
                       </a:endParaRPr>
                     </a:p>
                   </a:txBody>
-                  <a:tcPr/>
+                  <a:tcPr>
+                    <a:solidFill>
+                      <a:schemeClr val="bg2">
+                        <a:lumMod val="60000"/>
+                        <a:lumOff val="40000"/>
+                      </a:schemeClr>
+                    </a:solidFill>
+                  </a:tcPr>
                 </a:tc>
                 <a:tc>
                   <a:txBody>
@@ -7828,21 +7747,24 @@
                     <a:p>
                       <a:pPr algn="ctr"/>
                       <a:r>
-                        <a:rPr lang="en-US" dirty="0" smtClean="0">
-                          <a:solidFill>
-                            <a:schemeClr val="tx1"/>
-                          </a:solidFill>
-                        </a:rPr>
+                        <a:rPr lang="en-US" sz="1600" dirty="0" smtClean="0"/>
                         <a:t>Intermediate</a:t>
                       </a:r>
-                      <a:endParaRPr lang="en-US" dirty="0">
+                      <a:endParaRPr lang="en-US" sz="1600" dirty="0">
                         <a:solidFill>
                           <a:schemeClr val="tx1"/>
                         </a:solidFill>
                       </a:endParaRPr>
                     </a:p>
                   </a:txBody>
-                  <a:tcPr/>
+                  <a:tcPr>
+                    <a:solidFill>
+                      <a:schemeClr val="bg2">
+                        <a:lumMod val="60000"/>
+                        <a:lumOff val="40000"/>
+                      </a:schemeClr>
+                    </a:solidFill>
+                  </a:tcPr>
                 </a:tc>
                 <a:tc>
                   <a:txBody>
@@ -7851,24 +7773,27 @@
                     <a:p>
                       <a:pPr algn="ctr"/>
                       <a:r>
-                        <a:rPr lang="en-US" dirty="0" smtClean="0">
-                          <a:solidFill>
-                            <a:schemeClr val="tx1"/>
-                          </a:solidFill>
-                        </a:rPr>
+                        <a:rPr lang="en-US" sz="1600" dirty="0" smtClean="0"/>
                         <a:t>Advanced</a:t>
                       </a:r>
-                      <a:endParaRPr lang="en-US" dirty="0">
+                      <a:endParaRPr lang="en-US" sz="1600" dirty="0">
                         <a:solidFill>
                           <a:schemeClr val="tx1"/>
                         </a:solidFill>
                       </a:endParaRPr>
                     </a:p>
                   </a:txBody>
-                  <a:tcPr/>
+                  <a:tcPr>
+                    <a:solidFill>
+                      <a:schemeClr val="bg2">
+                        <a:lumMod val="60000"/>
+                        <a:lumOff val="40000"/>
+                      </a:schemeClr>
+                    </a:solidFill>
+                  </a:tcPr>
                 </a:tc>
               </a:tr>
-              <a:tr h="370840">
+              <a:tr h="3721295">
                 <a:tc>
                   <a:txBody>
                     <a:bodyPr/>
@@ -7879,8 +7804,8 @@
                         <a:buChar char="•"/>
                       </a:pPr>
                       <a:r>
-                        <a:rPr lang="en-US" sz="1600" dirty="0" smtClean="0"/>
-                        <a:t>Introduction to Brick/Software</a:t>
+                        <a:rPr lang="en-US" sz="1400" dirty="0" smtClean="0"/>
+                        <a:t>Build a Base Robot</a:t>
                       </a:r>
                     </a:p>
                     <a:p>
@@ -7889,14 +7814,13 @@
                         <a:buChar char="•"/>
                       </a:pPr>
                       <a:r>
-                        <a:rPr lang="en-US" sz="1600" dirty="0" smtClean="0"/>
-                        <a:t>Moving</a:t>
+                        <a:rPr lang="en-US" sz="1400" dirty="0" smtClean="0"/>
+                        <a:t>Introduction </a:t>
                       </a:r>
                       <a:r>
-                        <a:rPr lang="en-US" sz="1600" baseline="0" dirty="0" smtClean="0"/>
-                        <a:t> Straight</a:t>
+                        <a:rPr lang="en-US" sz="1400" dirty="0" smtClean="0"/>
+                        <a:t>to Brick/Software</a:t>
                       </a:r>
-                      <a:endParaRPr lang="en-US" sz="1600" baseline="0" dirty="0" smtClean="0"/>
                     </a:p>
                     <a:p>
                       <a:pPr marL="285750" indent="-285750">
@@ -7904,7 +7828,36 @@
                         <a:buChar char="•"/>
                       </a:pPr>
                       <a:r>
-                        <a:rPr lang="en-US" sz="1600" baseline="0" dirty="0" smtClean="0"/>
+                        <a:rPr lang="en-US" sz="1400" dirty="0" smtClean="0"/>
+                        <a:t>Moving</a:t>
+                      </a:r>
+                      <a:r>
+                        <a:rPr lang="en-US" sz="1400" baseline="0" dirty="0" smtClean="0"/>
+                        <a:t> </a:t>
+                      </a:r>
+                      <a:r>
+                        <a:rPr lang="en-US" sz="1400" baseline="0" dirty="0" smtClean="0"/>
+                        <a:t>Straight</a:t>
+                      </a:r>
+                    </a:p>
+                    <a:p>
+                      <a:pPr marL="285750" indent="-285750">
+                        <a:buFont typeface="Arial"/>
+                        <a:buChar char="•"/>
+                      </a:pPr>
+                      <a:r>
+                        <a:rPr lang="en-US" sz="1400" baseline="0" dirty="0" err="1" smtClean="0"/>
+                        <a:t>Pseudocode</a:t>
+                      </a:r>
+                      <a:endParaRPr lang="en-US" sz="1400" baseline="0" dirty="0" smtClean="0"/>
+                    </a:p>
+                    <a:p>
+                      <a:pPr marL="285750" indent="-285750">
+                        <a:buFont typeface="Arial"/>
+                        <a:buChar char="•"/>
+                      </a:pPr>
+                      <a:r>
+                        <a:rPr lang="en-US" sz="1400" baseline="0" dirty="0" smtClean="0"/>
                         <a:t>Turning</a:t>
                       </a:r>
                     </a:p>
@@ -7914,10 +7867,9 @@
                         <a:buChar char="•"/>
                       </a:pPr>
                       <a:r>
-                        <a:rPr lang="en-US" sz="1600" baseline="0" dirty="0" smtClean="0"/>
+                        <a:rPr lang="en-US" sz="1400" baseline="0" dirty="0" smtClean="0"/>
                         <a:t>Displaying Text and Graphics</a:t>
                       </a:r>
-                      <a:endParaRPr lang="en-US" sz="1600" baseline="0" dirty="0" smtClean="0"/>
                     </a:p>
                     <a:p>
                       <a:pPr marL="285750" indent="-285750">
@@ -7925,7 +7877,7 @@
                         <a:buChar char="•"/>
                       </a:pPr>
                       <a:r>
-                        <a:rPr lang="en-US" sz="1600" baseline="0" dirty="0" smtClean="0"/>
+                        <a:rPr lang="en-US" sz="1400" baseline="0" dirty="0" smtClean="0"/>
                         <a:t>Touch Sensor</a:t>
                       </a:r>
                     </a:p>
@@ -7935,7 +7887,7 @@
                         <a:buChar char="•"/>
                       </a:pPr>
                       <a:r>
-                        <a:rPr lang="en-US" sz="1600" baseline="0" dirty="0" smtClean="0"/>
+                        <a:rPr lang="en-US" sz="1400" baseline="0" dirty="0" smtClean="0"/>
                         <a:t>Color Sensor</a:t>
                       </a:r>
                     </a:p>
@@ -7945,7 +7897,7 @@
                         <a:buChar char="•"/>
                       </a:pPr>
                       <a:r>
-                        <a:rPr lang="en-US" sz="1600" baseline="0" dirty="0" smtClean="0"/>
+                        <a:rPr lang="en-US" sz="1400" baseline="0" dirty="0" smtClean="0"/>
                         <a:t>Loops</a:t>
                       </a:r>
                     </a:p>
@@ -7955,7 +7907,7 @@
                         <a:buChar char="•"/>
                       </a:pPr>
                       <a:r>
-                        <a:rPr lang="en-US" sz="1600" baseline="0" dirty="0" smtClean="0"/>
+                        <a:rPr lang="en-US" sz="1400" baseline="0" dirty="0" smtClean="0"/>
                         <a:t>Switches</a:t>
                       </a:r>
                     </a:p>
@@ -7965,7 +7917,7 @@
                         <a:buChar char="•"/>
                       </a:pPr>
                       <a:r>
-                        <a:rPr lang="en-US" sz="1600" baseline="0" dirty="0" smtClean="0"/>
+                        <a:rPr lang="en-US" sz="1400" baseline="0" dirty="0" smtClean="0"/>
                         <a:t>Ultrasonic Sensor</a:t>
                       </a:r>
                     </a:p>
@@ -7975,23 +7927,8 @@
                         <a:buChar char="•"/>
                       </a:pPr>
                       <a:r>
-                        <a:rPr lang="en-US" sz="1600" baseline="0" dirty="0" smtClean="0"/>
+                        <a:rPr lang="en-US" sz="1400" baseline="0" dirty="0" smtClean="0"/>
                         <a:t>Basic Line Follower</a:t>
-                      </a:r>
-                      <a:endParaRPr lang="en-US" sz="1600" baseline="0" dirty="0" smtClean="0"/>
-                    </a:p>
-                    <a:p>
-                      <a:pPr marL="285750" indent="-285750">
-                        <a:buFont typeface="Arial"/>
-                        <a:buChar char="•"/>
-                      </a:pPr>
-                      <a:r>
-                        <a:rPr lang="en-US" sz="1600" baseline="0" dirty="0" smtClean="0"/>
-                        <a:t>Basic </a:t>
-                      </a:r>
-                      <a:r>
-                        <a:rPr lang="en-US" sz="1600" baseline="0" dirty="0" smtClean="0"/>
-                        <a:t>Sequencer</a:t>
                       </a:r>
                     </a:p>
                     <a:p>
@@ -8000,13 +7937,26 @@
                         <a:buChar char="•"/>
                       </a:pPr>
                       <a:r>
-                        <a:rPr lang="en-US" sz="1600" baseline="0" dirty="0" smtClean="0"/>
+                        <a:rPr lang="en-US" sz="1400" baseline="0" dirty="0" smtClean="0"/>
+                        <a:t>Basic Sequencer</a:t>
+                      </a:r>
+                    </a:p>
+                    <a:p>
+                      <a:pPr marL="285750" indent="-285750">
+                        <a:buFont typeface="Arial"/>
+                        <a:buChar char="•"/>
+                      </a:pPr>
+                      <a:r>
+                        <a:rPr lang="en-US" sz="1400" baseline="0" dirty="0" smtClean="0"/>
                         <a:t>Final Challenge</a:t>
                       </a:r>
-                      <a:endParaRPr lang="en-US" sz="1600" baseline="0" dirty="0" smtClean="0"/>
                     </a:p>
                   </a:txBody>
-                  <a:tcPr/>
+                  <a:tcPr>
+                    <a:solidFill>
+                      <a:srgbClr val="FFFFFF"/>
+                    </a:solidFill>
+                  </a:tcPr>
                 </a:tc>
                 <a:tc>
                   <a:txBody>
@@ -8018,12 +7968,8 @@
                         <a:buChar char="•"/>
                       </a:pPr>
                       <a:r>
-                        <a:rPr lang="en-US" sz="1600" dirty="0" smtClean="0"/>
-                        <a:t>My </a:t>
-                      </a:r>
-                      <a:r>
-                        <a:rPr lang="en-US" sz="1600" dirty="0" smtClean="0"/>
-                        <a:t>Blocks with Inputs and Outputs</a:t>
+                        <a:rPr lang="en-US" sz="1400" dirty="0" smtClean="0"/>
+                        <a:t>My Blocks with Inputs and Outputs</a:t>
                       </a:r>
                     </a:p>
                     <a:p>
@@ -8032,11 +7978,11 @@
                         <a:buChar char="•"/>
                       </a:pPr>
                       <a:r>
-                        <a:rPr lang="en-US" sz="1600" dirty="0" smtClean="0"/>
+                        <a:rPr lang="en-US" sz="1400" dirty="0" smtClean="0"/>
                         <a:t>Moving</a:t>
                       </a:r>
                       <a:r>
-                        <a:rPr lang="en-US" sz="1600" baseline="0" dirty="0" smtClean="0"/>
+                        <a:rPr lang="en-US" sz="1400" baseline="0" dirty="0" smtClean="0"/>
                         <a:t> with My Blocks</a:t>
                       </a:r>
                     </a:p>
@@ -8046,10 +7992,10 @@
                         <a:buChar char="•"/>
                       </a:pPr>
                       <a:r>
-                        <a:rPr lang="en-US" sz="1600" baseline="0" dirty="0" smtClean="0"/>
+                        <a:rPr lang="en-US" sz="1400" baseline="0" dirty="0" smtClean="0"/>
                         <a:t>Turning with My Blocks</a:t>
                       </a:r>
-                      <a:endParaRPr lang="en-US" sz="1600" dirty="0" smtClean="0"/>
+                      <a:endParaRPr lang="en-US" sz="1400" dirty="0" smtClean="0"/>
                     </a:p>
                     <a:p>
                       <a:pPr marL="285750" indent="-285750">
@@ -8057,20 +8003,20 @@
                         <a:buChar char="•"/>
                       </a:pPr>
                       <a:r>
-                        <a:rPr lang="en-US" sz="1600" dirty="0" smtClean="0"/>
+                        <a:rPr lang="en-US" sz="1400" dirty="0" smtClean="0"/>
                         <a:t>Color</a:t>
                       </a:r>
                       <a:r>
-                        <a:rPr lang="en-US" sz="1600" baseline="0" dirty="0" smtClean="0"/>
+                        <a:rPr lang="en-US" sz="1400" baseline="0" dirty="0" smtClean="0"/>
                         <a:t> Line </a:t>
                       </a:r>
                       <a:r>
-                        <a:rPr lang="en-US" sz="1600" dirty="0" smtClean="0"/>
-                        <a:t>Follower </a:t>
+                        <a:rPr lang="en-US" sz="1400" dirty="0" smtClean="0"/>
+                        <a:t>Follower with My </a:t>
                       </a:r>
                       <a:r>
-                        <a:rPr lang="en-US" sz="1600" dirty="0" smtClean="0"/>
-                        <a:t>with My Blocks</a:t>
+                        <a:rPr lang="en-US" sz="1400" dirty="0" smtClean="0"/>
+                        <a:t>Blocks</a:t>
                       </a:r>
                     </a:p>
                     <a:p>
@@ -8079,7 +8025,22 @@
                         <a:buChar char="•"/>
                       </a:pPr>
                       <a:r>
-                        <a:rPr lang="en-US" sz="1600" dirty="0" smtClean="0"/>
+                        <a:rPr lang="en-US" sz="1400" dirty="0" smtClean="0"/>
+                        <a:t>Infrared</a:t>
+                      </a:r>
+                      <a:r>
+                        <a:rPr lang="en-US" sz="1400" baseline="0" dirty="0" smtClean="0"/>
+                        <a:t> Sensor</a:t>
+                      </a:r>
+                      <a:endParaRPr lang="en-US" sz="1400" dirty="0" smtClean="0"/>
+                    </a:p>
+                    <a:p>
+                      <a:pPr marL="285750" indent="-285750">
+                        <a:buFont typeface="Arial"/>
+                        <a:buChar char="•"/>
+                      </a:pPr>
+                      <a:r>
+                        <a:rPr lang="en-US" sz="1400" dirty="0" smtClean="0"/>
                         <a:t>Debugging</a:t>
                       </a:r>
                     </a:p>
@@ -8089,11 +8050,11 @@
                         <a:buChar char="•"/>
                       </a:pPr>
                       <a:r>
-                        <a:rPr lang="en-US" sz="1600" dirty="0" smtClean="0"/>
+                        <a:rPr lang="en-US" sz="1400" dirty="0" smtClean="0"/>
                         <a:t>Move</a:t>
                       </a:r>
                       <a:r>
-                        <a:rPr lang="en-US" sz="1600" baseline="0" dirty="0" smtClean="0"/>
+                        <a:rPr lang="en-US" sz="1400" baseline="0" dirty="0" smtClean="0"/>
                         <a:t> Blocks</a:t>
                       </a:r>
                     </a:p>
@@ -8103,7 +8064,7 @@
                         <a:buChar char="•"/>
                       </a:pPr>
                       <a:r>
-                        <a:rPr lang="en-US" sz="1600" baseline="0" dirty="0" smtClean="0"/>
+                        <a:rPr lang="en-US" sz="1400" baseline="0" dirty="0" smtClean="0"/>
                         <a:t>Reliability</a:t>
                       </a:r>
                     </a:p>
@@ -8113,7 +8074,7 @@
                         <a:buChar char="•"/>
                       </a:pPr>
                       <a:r>
-                        <a:rPr lang="en-US" sz="1600" baseline="0" dirty="0" smtClean="0"/>
+                        <a:rPr lang="en-US" sz="1400" baseline="0" dirty="0" smtClean="0"/>
                         <a:t>Intermediate Menu System</a:t>
                       </a:r>
                     </a:p>
@@ -8123,8 +8084,12 @@
                         <a:buChar char="•"/>
                       </a:pPr>
                       <a:r>
-                        <a:rPr lang="en-US" sz="1600" baseline="0" dirty="0" smtClean="0"/>
-                        <a:t>Color Sensor Calibration</a:t>
+                        <a:rPr lang="en-US" sz="1400" baseline="0" dirty="0" smtClean="0"/>
+                        <a:t>Color Sensor </a:t>
+                      </a:r>
+                      <a:r>
+                        <a:rPr lang="en-US" sz="1400" baseline="0" dirty="0" smtClean="0"/>
+                        <a:t>Calibration</a:t>
                       </a:r>
                     </a:p>
                     <a:p>
@@ -8133,7 +8098,18 @@
                         <a:buChar char="•"/>
                       </a:pPr>
                       <a:r>
-                        <a:rPr lang="en-US" sz="1600" baseline="0" dirty="0" smtClean="0"/>
+                        <a:rPr lang="en-US" sz="1400" baseline="0" dirty="0" smtClean="0"/>
+                        <a:t>Variables</a:t>
+                      </a:r>
+                      <a:endParaRPr lang="en-US" sz="1400" baseline="0" dirty="0" smtClean="0"/>
+                    </a:p>
+                    <a:p>
+                      <a:pPr marL="285750" indent="-285750">
+                        <a:buFont typeface="Arial"/>
+                        <a:buChar char="•"/>
+                      </a:pPr>
+                      <a:r>
+                        <a:rPr lang="en-US" sz="1400" baseline="0" dirty="0" smtClean="0"/>
                         <a:t>Parallel Beams</a:t>
                       </a:r>
                     </a:p>
@@ -8142,10 +8118,14 @@
                         <a:buFont typeface="Arial"/>
                         <a:buNone/>
                       </a:pPr>
-                      <a:endParaRPr lang="en-US" sz="1600" dirty="0"/>
+                      <a:endParaRPr lang="en-US" sz="1400" dirty="0"/>
                     </a:p>
                   </a:txBody>
-                  <a:tcPr/>
+                  <a:tcPr>
+                    <a:solidFill>
+                      <a:srgbClr val="FFFFFF"/>
+                    </a:solidFill>
+                  </a:tcPr>
                 </a:tc>
                 <a:tc>
                   <a:txBody>
@@ -8157,12 +8137,16 @@
                         <a:buChar char="•"/>
                       </a:pPr>
                       <a:r>
-                        <a:rPr lang="en-US" sz="1600" dirty="0" smtClean="0"/>
+                        <a:rPr lang="en-US" sz="1400" dirty="0" smtClean="0"/>
                         <a:t>Parallel</a:t>
                       </a:r>
                       <a:r>
-                        <a:rPr lang="en-US" sz="1600" baseline="0" dirty="0" smtClean="0"/>
-                        <a:t> Beams Sync</a:t>
+                        <a:rPr lang="en-US" sz="1400" baseline="0" dirty="0" smtClean="0"/>
+                        <a:t> Beams </a:t>
+                      </a:r>
+                      <a:r>
+                        <a:rPr lang="en-US" sz="1400" baseline="0" dirty="0" smtClean="0"/>
+                        <a:t>Sync</a:t>
                       </a:r>
                     </a:p>
                     <a:p>
@@ -8171,7 +8155,18 @@
                         <a:buChar char="•"/>
                       </a:pPr>
                       <a:r>
-                        <a:rPr lang="en-US" sz="1600" baseline="0" dirty="0" smtClean="0"/>
+                        <a:rPr lang="en-US" sz="1400" baseline="0" dirty="0" smtClean="0"/>
+                        <a:t>Arrays</a:t>
+                      </a:r>
+                      <a:endParaRPr lang="en-US" sz="1400" baseline="0" dirty="0" smtClean="0"/>
+                    </a:p>
+                    <a:p>
+                      <a:pPr marL="285750" indent="-285750">
+                        <a:buFont typeface="Arial"/>
+                        <a:buChar char="•"/>
+                      </a:pPr>
+                      <a:r>
+                        <a:rPr lang="en-US" sz="1400" baseline="0" dirty="0" smtClean="0"/>
                         <a:t>Proportional Control</a:t>
                       </a:r>
                     </a:p>
@@ -8181,8 +8176,12 @@
                         <a:buChar char="•"/>
                       </a:pPr>
                       <a:r>
-                        <a:rPr lang="en-US" sz="1600" baseline="0" dirty="0" smtClean="0"/>
-                        <a:t>Proportional Line Follower</a:t>
+                        <a:rPr lang="en-US" sz="1400" baseline="0" dirty="0" smtClean="0"/>
+                        <a:t>Proportional Line </a:t>
+                      </a:r>
+                      <a:r>
+                        <a:rPr lang="en-US" sz="1400" baseline="0" dirty="0" smtClean="0"/>
+                        <a:t>Follower</a:t>
                       </a:r>
                     </a:p>
                     <a:p>
@@ -8191,10 +8190,9 @@
                         <a:buChar char="•"/>
                       </a:pPr>
                       <a:r>
-                        <a:rPr lang="en-US" sz="1600" baseline="0" dirty="0" smtClean="0"/>
-                        <a:t>Gyro</a:t>
+                        <a:rPr lang="en-US" sz="1400" baseline="0" dirty="0" smtClean="0"/>
+                        <a:t>Proportional 2 Color Line Follower</a:t>
                       </a:r>
-                      <a:endParaRPr lang="en-US" sz="1600" baseline="0" dirty="0" smtClean="0"/>
                     </a:p>
                     <a:p>
                       <a:pPr marL="285750" indent="-285750">
@@ -8202,10 +8200,10 @@
                         <a:buChar char="•"/>
                       </a:pPr>
                       <a:r>
-                        <a:rPr lang="en-US" sz="1600" baseline="0" dirty="0" smtClean="0"/>
-                        <a:t>Gyro Turns</a:t>
+                        <a:rPr lang="en-US" sz="1400" baseline="0" dirty="0" smtClean="0"/>
+                        <a:t>Ramping Up</a:t>
                       </a:r>
-                      <a:endParaRPr lang="en-US" sz="1600" baseline="0" dirty="0" smtClean="0"/>
+                      <a:endParaRPr lang="en-US" sz="1400" baseline="0" dirty="0" smtClean="0"/>
                     </a:p>
                     <a:p>
                       <a:pPr marL="285750" indent="-285750">
@@ -8213,7 +8211,57 @@
                         <a:buChar char="•"/>
                       </a:pPr>
                       <a:r>
-                        <a:rPr lang="en-US" sz="1600" baseline="0" dirty="0" smtClean="0"/>
+                        <a:rPr lang="en-US" sz="1400" baseline="0" dirty="0" smtClean="0"/>
+                        <a:t>Gyro Sensor</a:t>
+                      </a:r>
+                      <a:endParaRPr lang="en-US" sz="1400" baseline="0" dirty="0" smtClean="0"/>
+                    </a:p>
+                    <a:p>
+                      <a:pPr marL="285750" indent="-285750">
+                        <a:buFont typeface="Arial"/>
+                        <a:buChar char="•"/>
+                      </a:pPr>
+                      <a:r>
+                        <a:rPr lang="en-US" sz="1400" baseline="0" dirty="0" smtClean="0"/>
+                        <a:t>Gyro </a:t>
+                      </a:r>
+                      <a:r>
+                        <a:rPr lang="en-US" sz="1400" baseline="0" dirty="0" smtClean="0"/>
+                        <a:t>Sensor Turns</a:t>
+                      </a:r>
+                      <a:endParaRPr lang="en-US" sz="1400" baseline="0" dirty="0" smtClean="0"/>
+                    </a:p>
+                    <a:p>
+                      <a:pPr marL="285750" indent="-285750">
+                        <a:buFont typeface="Arial"/>
+                        <a:buChar char="•"/>
+                      </a:pPr>
+                      <a:r>
+                        <a:rPr lang="en-US" sz="1400" baseline="0" dirty="0" smtClean="0"/>
+                        <a:t>Squaring on </a:t>
+                      </a:r>
+                      <a:r>
+                        <a:rPr lang="en-US" sz="1400" baseline="0" dirty="0" smtClean="0"/>
+                        <a:t>Lines</a:t>
+                      </a:r>
+                    </a:p>
+                    <a:p>
+                      <a:pPr marL="285750" indent="-285750">
+                        <a:buFont typeface="Arial"/>
+                        <a:buChar char="•"/>
+                      </a:pPr>
+                      <a:r>
+                        <a:rPr lang="en-US" sz="1400" baseline="0" dirty="0" smtClean="0"/>
+                        <a:t>Gyro Sensor: Move Straight and Wall Follow</a:t>
+                      </a:r>
+                    </a:p>
+                    <a:p>
+                      <a:pPr marL="285750" indent="-285750">
+                        <a:buFont typeface="Arial"/>
+                        <a:buChar char="•"/>
+                      </a:pPr>
+                      <a:r>
+                        <a:rPr lang="en-US" sz="1400" baseline="0" dirty="0" smtClean="0"/>
                         <a:t>Squaring on Lines</a:t>
                       </a:r>
                     </a:p>
@@ -8223,8 +8271,12 @@
                         <a:buChar char="•"/>
                       </a:pPr>
                       <a:r>
-                        <a:rPr lang="en-US" sz="1600" baseline="0" dirty="0" smtClean="0"/>
-                        <a:t>Alternative Squaring</a:t>
+                        <a:rPr lang="en-US" sz="1400" baseline="0" dirty="0" smtClean="0"/>
+                        <a:t>Stall </a:t>
+                      </a:r>
+                      <a:r>
+                        <a:rPr lang="en-US" sz="1400" baseline="0" dirty="0" smtClean="0"/>
+                        <a:t>Detection</a:t>
                       </a:r>
                     </a:p>
                     <a:p>
@@ -8233,33 +8285,21 @@
                         <a:buChar char="•"/>
                       </a:pPr>
                       <a:r>
-                        <a:rPr lang="en-US" sz="1600" baseline="0" dirty="0" smtClean="0"/>
-                        <a:t>Stall Detection</a:t>
+                        <a:rPr lang="en-US" sz="1400" baseline="0" dirty="0" smtClean="0"/>
+                        <a:t>Menu </a:t>
                       </a:r>
-                    </a:p>
-                    <a:p>
-                      <a:pPr marL="285750" indent="-285750">
-                        <a:buFont typeface="Arial"/>
-                        <a:buChar char="•"/>
-                      </a:pPr>
                       <a:r>
-                        <a:rPr lang="en-US" sz="1600" baseline="0" dirty="0" smtClean="0"/>
-                        <a:t>Menu System</a:t>
+                        <a:rPr lang="en-US" sz="1400" baseline="0" dirty="0" smtClean="0"/>
+                        <a:t>System</a:t>
                       </a:r>
-                    </a:p>
-                    <a:p>
-                      <a:pPr marL="285750" indent="-285750">
-                        <a:buFont typeface="Arial"/>
-                        <a:buChar char="•"/>
-                      </a:pPr>
-                      <a:r>
-                        <a:rPr lang="en-US" sz="1600" baseline="0" dirty="0" smtClean="0"/>
-                        <a:t>NXT Light Sensors in EV3</a:t>
-                      </a:r>
-                      <a:endParaRPr lang="en-US" sz="1600" dirty="0"/>
+                      <a:endParaRPr lang="en-US" sz="1400" dirty="0"/>
                     </a:p>
                   </a:txBody>
-                  <a:tcPr/>
+                  <a:tcPr>
+                    <a:solidFill>
+                      <a:srgbClr val="FFFFFF"/>
+                    </a:solidFill>
+                  </a:tcPr>
                 </a:tc>
               </a:tr>
             </a:tbl>
@@ -8283,39 +8323,318 @@
           <a:p>
             <a:r>
               <a:rPr lang="en-US" smtClean="0"/>
-              <a:t>Copyright © EV3Lessons.com 2015 (Last edit: 2/26/2015)</a:t>
-            </a:r>
-            <a:endParaRPr lang="en-US"/>
-          </a:p>
-        </p:txBody>
-      </p:sp>
-      <p:sp>
-        <p:nvSpPr>
-          <p:cNvPr id="5" name="Slide Number Placeholder 4"/>
-          <p:cNvSpPr>
-            <a:spLocks noGrp="1"/>
-          </p:cNvSpPr>
-          <p:nvPr>
-            <p:ph type="sldNum" sz="quarter" idx="12"/>
-          </p:nvPr>
-        </p:nvSpPr>
-        <p:spPr/>
-        <p:txBody>
-          <a:bodyPr/>
-          <a:lstStyle/>
-          <a:p>
-            <a:fld id="{4DBC7FC8-25FB-FC45-8177-2B991DA6778C}" type="slidenum">
-              <a:rPr lang="en-US" smtClean="0"/>
-              <a:t>4</a:t>
-            </a:fld>
-            <a:endParaRPr lang="en-US"/>
-          </a:p>
-        </p:txBody>
-      </p:sp>
+              <a:t>Copyright © EV3Lessons.com 2015 (Last edit: 9/22/2015)</a:t>
+            </a:r>
+            <a:endParaRPr lang="en-US"/>
+          </a:p>
+        </p:txBody>
+      </p:sp>
+      <p:pic>
+        <p:nvPicPr>
+          <p:cNvPr id="7" name="Picture 6"/>
+          <p:cNvPicPr>
+            <a:picLocks noChangeAspect="1"/>
+          </p:cNvPicPr>
+          <p:nvPr/>
+        </p:nvPicPr>
+        <p:blipFill>
+          <a:blip r:embed="rId2"/>
+          <a:stretch>
+            <a:fillRect/>
+          </a:stretch>
+        </p:blipFill>
+        <p:spPr>
+          <a:xfrm>
+            <a:off x="4180265" y="1387967"/>
+            <a:ext cx="579189" cy="1174693"/>
+          </a:xfrm>
+          <a:prstGeom prst="rect">
+            <a:avLst/>
+          </a:prstGeom>
+        </p:spPr>
+      </p:pic>
+      <p:pic>
+        <p:nvPicPr>
+          <p:cNvPr id="10" name="Picture 9"/>
+          <p:cNvPicPr>
+            <a:picLocks noChangeAspect="1"/>
+          </p:cNvPicPr>
+          <p:nvPr/>
+        </p:nvPicPr>
+        <p:blipFill>
+          <a:blip r:embed="rId3"/>
+          <a:stretch>
+            <a:fillRect/>
+          </a:stretch>
+        </p:blipFill>
+        <p:spPr>
+          <a:xfrm>
+            <a:off x="6981827" y="1387967"/>
+            <a:ext cx="571031" cy="1207323"/>
+          </a:xfrm>
+          <a:prstGeom prst="rect">
+            <a:avLst/>
+          </a:prstGeom>
+        </p:spPr>
+      </p:pic>
+      <p:pic>
+        <p:nvPicPr>
+          <p:cNvPr id="11" name="Picture 10"/>
+          <p:cNvPicPr>
+            <a:picLocks noChangeAspect="1"/>
+          </p:cNvPicPr>
+          <p:nvPr/>
+        </p:nvPicPr>
+        <p:blipFill>
+          <a:blip r:embed="rId4"/>
+          <a:stretch>
+            <a:fillRect/>
+          </a:stretch>
+        </p:blipFill>
+        <p:spPr>
+          <a:xfrm>
+            <a:off x="1469964" y="1387967"/>
+            <a:ext cx="579189" cy="1174693"/>
+          </a:xfrm>
+          <a:prstGeom prst="rect">
+            <a:avLst/>
+          </a:prstGeom>
+        </p:spPr>
+      </p:pic>
     </p:spTree>
     <p:extLst>
       <p:ext uri="{BB962C8B-B14F-4D97-AF65-F5344CB8AC3E}">
         <p14:creationId xmlns:p14="http://schemas.microsoft.com/office/powerpoint/2010/main" val="4175683872"/>
+      </p:ext>
+    </p:extLst>
+  </p:cSld>
+  <p:clrMapOvr>
+    <a:masterClrMapping/>
+  </p:clrMapOvr>
+</p:sld>
+</file>
+
+<file path=ppt/slides/slide5.xml><?xml version="1.0" encoding="utf-8"?>
+<p:sld xmlns:a="http://schemas.openxmlformats.org/drawingml/2006/main" xmlns:r="http://schemas.openxmlformats.org/officeDocument/2006/relationships" xmlns:p="http://schemas.openxmlformats.org/presentationml/2006/main">
+  <p:cSld>
+    <p:spTree>
+      <p:nvGrpSpPr>
+        <p:cNvPr id="1" name=""/>
+        <p:cNvGrpSpPr/>
+        <p:nvPr/>
+      </p:nvGrpSpPr>
+      <p:grpSpPr>
+        <a:xfrm>
+          <a:off x="0" y="0"/>
+          <a:ext cx="0" cy="0"/>
+          <a:chOff x="0" y="0"/>
+          <a:chExt cx="0" cy="0"/>
+        </a:xfrm>
+      </p:grpSpPr>
+      <p:pic>
+        <p:nvPicPr>
+          <p:cNvPr id="9" name="Picture 8" descr="Screen Shot 2015-09-11 at 8.53.12 PM.png"/>
+          <p:cNvPicPr>
+            <a:picLocks noChangeAspect="1"/>
+          </p:cNvPicPr>
+          <p:nvPr/>
+        </p:nvPicPr>
+        <p:blipFill>
+          <a:blip r:embed="rId2">
+            <a:extLst>
+              <a:ext uri="{28A0092B-C50C-407E-A947-70E740481C1C}">
+                <a14:useLocalDpi xmlns:a14="http://schemas.microsoft.com/office/drawing/2010/main" val="0"/>
+              </a:ext>
+            </a:extLst>
+          </a:blip>
+          <a:stretch>
+            <a:fillRect/>
+          </a:stretch>
+        </p:blipFill>
+        <p:spPr>
+          <a:xfrm>
+            <a:off x="4124838" y="2445077"/>
+            <a:ext cx="2606409" cy="3315352"/>
+          </a:xfrm>
+          <a:prstGeom prst="rect">
+            <a:avLst/>
+          </a:prstGeom>
+        </p:spPr>
+      </p:pic>
+      <p:pic>
+        <p:nvPicPr>
+          <p:cNvPr id="8" name="Picture 7" descr="Screen Shot 2015-09-11 at 8.53.29 PM.png"/>
+          <p:cNvPicPr>
+            <a:picLocks noChangeAspect="1"/>
+          </p:cNvPicPr>
+          <p:nvPr/>
+        </p:nvPicPr>
+        <p:blipFill>
+          <a:blip r:embed="rId3">
+            <a:extLst>
+              <a:ext uri="{28A0092B-C50C-407E-A947-70E740481C1C}">
+                <a14:useLocalDpi xmlns:a14="http://schemas.microsoft.com/office/drawing/2010/main" val="0"/>
+              </a:ext>
+            </a:extLst>
+          </a:blip>
+          <a:stretch>
+            <a:fillRect/>
+          </a:stretch>
+        </p:blipFill>
+        <p:spPr>
+          <a:xfrm>
+            <a:off x="5823430" y="3091700"/>
+            <a:ext cx="2598207" cy="3284758"/>
+          </a:xfrm>
+          <a:prstGeom prst="rect">
+            <a:avLst/>
+          </a:prstGeom>
+        </p:spPr>
+      </p:pic>
+      <p:sp>
+        <p:nvSpPr>
+          <p:cNvPr id="2" name="Title 1"/>
+          <p:cNvSpPr>
+            <a:spLocks noGrp="1"/>
+          </p:cNvSpPr>
+          <p:nvPr>
+            <p:ph type="title"/>
+          </p:nvPr>
+        </p:nvSpPr>
+        <p:spPr/>
+        <p:txBody>
+          <a:bodyPr/>
+          <a:lstStyle/>
+          <a:p>
+            <a:r>
+              <a:rPr lang="en-US" dirty="0" smtClean="0"/>
+              <a:t>Quick guides IN RESOURCES</a:t>
+            </a:r>
+            <a:endParaRPr lang="en-US" dirty="0"/>
+          </a:p>
+        </p:txBody>
+      </p:sp>
+      <p:sp>
+        <p:nvSpPr>
+          <p:cNvPr id="3" name="Content Placeholder 2"/>
+          <p:cNvSpPr>
+            <a:spLocks noGrp="1"/>
+          </p:cNvSpPr>
+          <p:nvPr>
+            <p:ph idx="1"/>
+          </p:nvPr>
+        </p:nvSpPr>
+        <p:spPr>
+          <a:xfrm>
+            <a:off x="457200" y="1124087"/>
+            <a:ext cx="8245474" cy="4373563"/>
+          </a:xfrm>
+        </p:spPr>
+        <p:txBody>
+          <a:bodyPr/>
+          <a:lstStyle/>
+          <a:p>
+            <a:r>
+              <a:rPr lang="en-US" dirty="0" smtClean="0"/>
+              <a:t>These provide quick responses to important topics and questions that are common.</a:t>
+            </a:r>
+          </a:p>
+          <a:p>
+            <a:r>
+              <a:rPr lang="en-US" dirty="0" smtClean="0"/>
+              <a:t>Use them as you need – as handouts, as discussion guides</a:t>
+            </a:r>
+            <a:endParaRPr lang="en-US" dirty="0"/>
+          </a:p>
+        </p:txBody>
+      </p:sp>
+      <p:sp>
+        <p:nvSpPr>
+          <p:cNvPr id="4" name="Footer Placeholder 3"/>
+          <p:cNvSpPr>
+            <a:spLocks noGrp="1"/>
+          </p:cNvSpPr>
+          <p:nvPr>
+            <p:ph type="ftr" sz="quarter" idx="11"/>
+          </p:nvPr>
+        </p:nvSpPr>
+        <p:spPr/>
+        <p:txBody>
+          <a:bodyPr/>
+          <a:lstStyle/>
+          <a:p>
+            <a:r>
+              <a:rPr lang="en-US" smtClean="0"/>
+              <a:t>Copyright © EV3Lessons.com 2015 (Last edit: 9/22/2015)</a:t>
+            </a:r>
+            <a:endParaRPr lang="en-US"/>
+          </a:p>
+        </p:txBody>
+      </p:sp>
+      <p:pic>
+        <p:nvPicPr>
+          <p:cNvPr id="6" name="Picture 5" descr="Screen Shot 2015-09-20 at 11.59.17 AM.png"/>
+          <p:cNvPicPr>
+            <a:picLocks noChangeAspect="1"/>
+          </p:cNvPicPr>
+          <p:nvPr/>
+        </p:nvPicPr>
+        <p:blipFill>
+          <a:blip r:embed="rId4">
+            <a:extLst>
+              <a:ext uri="{28A0092B-C50C-407E-A947-70E740481C1C}">
+                <a14:useLocalDpi xmlns:a14="http://schemas.microsoft.com/office/drawing/2010/main" val="0"/>
+              </a:ext>
+            </a:extLst>
+          </a:blip>
+          <a:stretch>
+            <a:fillRect/>
+          </a:stretch>
+        </p:blipFill>
+        <p:spPr>
+          <a:xfrm>
+            <a:off x="549916" y="2445076"/>
+            <a:ext cx="2566277" cy="3315352"/>
+          </a:xfrm>
+          <a:prstGeom prst="rect">
+            <a:avLst/>
+          </a:prstGeom>
+        </p:spPr>
+      </p:pic>
+      <p:pic>
+        <p:nvPicPr>
+          <p:cNvPr id="7" name="Picture 6" descr="Screen Shot 2015-09-11 at 8.53.44 PM.png"/>
+          <p:cNvPicPr>
+            <a:picLocks noChangeAspect="1"/>
+          </p:cNvPicPr>
+          <p:nvPr/>
+        </p:nvPicPr>
+        <p:blipFill>
+          <a:blip r:embed="rId5">
+            <a:extLst>
+              <a:ext uri="{28A0092B-C50C-407E-A947-70E740481C1C}">
+                <a14:useLocalDpi xmlns:a14="http://schemas.microsoft.com/office/drawing/2010/main" val="0"/>
+              </a:ext>
+            </a:extLst>
+          </a:blip>
+          <a:stretch>
+            <a:fillRect/>
+          </a:stretch>
+        </p:blipFill>
+        <p:spPr>
+          <a:xfrm>
+            <a:off x="2142934" y="3091699"/>
+            <a:ext cx="2565318" cy="3284758"/>
+          </a:xfrm>
+          <a:prstGeom prst="rect">
+            <a:avLst/>
+          </a:prstGeom>
+        </p:spPr>
+      </p:pic>
+    </p:spTree>
+    <p:extLst>
+      <p:ext uri="{BB962C8B-B14F-4D97-AF65-F5344CB8AC3E}">
+        <p14:creationId xmlns:p14="http://schemas.microsoft.com/office/powerpoint/2010/main" val="4157959621"/>
       </p:ext>
     </p:extLst>
   </p:cSld>
@@ -8833,7 +9152,7 @@
   <a:extraClrSchemeLst/>
   <a:extLst>
     <a:ext uri="{05A4C25C-085E-4340-85A3-A5531E510DB2}">
-      <thm15:themeFamily xmlns:thm15="http://schemas.microsoft.com/office/thememl/2012/main" name="Office Theme" id="{62F939B6-93AF-4DB8-9C6B-D6C7DFDC589F}" vid="{4A3C46E8-61CC-4603-A589-7422A47A8E4A}"/>
+      <thm15:themeFamily xmlns:thm15="http://schemas.microsoft.com/office/thememl/2012/main" xmlns="" name="Office Theme" id="{62F939B6-93AF-4DB8-9C6B-D6C7DFDC589F}" vid="{4A3C46E8-61CC-4603-A589-7422A47A8E4A}"/>
     </a:ext>
   </a:extLst>
 </a:theme>

</xml_diff>